<commit_message>
tiep duc viet bao cao
</commit_message>
<xml_diff>
--- a/Slide_DATN.pptx
+++ b/Slide_DATN.pptx
@@ -104,6 +104,11 @@
       </a:defRPr>
     </a:lvl9pPr>
   </p:defaultTextStyle>
+  <p:extLst>
+    <p:ext uri="{EFAFB233-063F-42B5-8137-9DF3F51BA10A}">
+      <p15:sldGuideLst xmlns:p15="http://schemas.microsoft.com/office/powerpoint/2012/main"/>
+    </p:ext>
+  </p:extLst>
 </p:presentation>
 </file>
 
@@ -254,7 +259,7 @@
           <a:p>
             <a:fld id="{A380659A-5C34-46FB-AFA7-F143BA8A4EDB}" type="datetimeFigureOut">
               <a:rPr lang="en-US" smtClean="0"/>
-              <a:t>3/22/2023</a:t>
+              <a:t>3/29/2023</a:t>
             </a:fld>
             <a:endParaRPr lang="en-US"/>
           </a:p>
@@ -452,7 +457,7 @@
           <a:p>
             <a:fld id="{A380659A-5C34-46FB-AFA7-F143BA8A4EDB}" type="datetimeFigureOut">
               <a:rPr lang="en-US" smtClean="0"/>
-              <a:t>3/22/2023</a:t>
+              <a:t>3/29/2023</a:t>
             </a:fld>
             <a:endParaRPr lang="en-US"/>
           </a:p>
@@ -660,7 +665,7 @@
           <a:p>
             <a:fld id="{A380659A-5C34-46FB-AFA7-F143BA8A4EDB}" type="datetimeFigureOut">
               <a:rPr lang="en-US" smtClean="0"/>
-              <a:t>3/22/2023</a:t>
+              <a:t>3/29/2023</a:t>
             </a:fld>
             <a:endParaRPr lang="en-US"/>
           </a:p>
@@ -858,7 +863,7 @@
           <a:p>
             <a:fld id="{A380659A-5C34-46FB-AFA7-F143BA8A4EDB}" type="datetimeFigureOut">
               <a:rPr lang="en-US" smtClean="0"/>
-              <a:t>3/22/2023</a:t>
+              <a:t>3/29/2023</a:t>
             </a:fld>
             <a:endParaRPr lang="en-US"/>
           </a:p>
@@ -1133,7 +1138,7 @@
           <a:p>
             <a:fld id="{A380659A-5C34-46FB-AFA7-F143BA8A4EDB}" type="datetimeFigureOut">
               <a:rPr lang="en-US" smtClean="0"/>
-              <a:t>3/22/2023</a:t>
+              <a:t>3/29/2023</a:t>
             </a:fld>
             <a:endParaRPr lang="en-US"/>
           </a:p>
@@ -1398,7 +1403,7 @@
           <a:p>
             <a:fld id="{A380659A-5C34-46FB-AFA7-F143BA8A4EDB}" type="datetimeFigureOut">
               <a:rPr lang="en-US" smtClean="0"/>
-              <a:t>3/22/2023</a:t>
+              <a:t>3/29/2023</a:t>
             </a:fld>
             <a:endParaRPr lang="en-US"/>
           </a:p>
@@ -1810,7 +1815,7 @@
           <a:p>
             <a:fld id="{A380659A-5C34-46FB-AFA7-F143BA8A4EDB}" type="datetimeFigureOut">
               <a:rPr lang="en-US" smtClean="0"/>
-              <a:t>3/22/2023</a:t>
+              <a:t>3/29/2023</a:t>
             </a:fld>
             <a:endParaRPr lang="en-US"/>
           </a:p>
@@ -1951,7 +1956,7 @@
           <a:p>
             <a:fld id="{A380659A-5C34-46FB-AFA7-F143BA8A4EDB}" type="datetimeFigureOut">
               <a:rPr lang="en-US" smtClean="0"/>
-              <a:t>3/22/2023</a:t>
+              <a:t>3/29/2023</a:t>
             </a:fld>
             <a:endParaRPr lang="en-US"/>
           </a:p>
@@ -2064,7 +2069,7 @@
           <a:p>
             <a:fld id="{A380659A-5C34-46FB-AFA7-F143BA8A4EDB}" type="datetimeFigureOut">
               <a:rPr lang="en-US" smtClean="0"/>
-              <a:t>3/22/2023</a:t>
+              <a:t>3/29/2023</a:t>
             </a:fld>
             <a:endParaRPr lang="en-US"/>
           </a:p>
@@ -2375,7 +2380,7 @@
           <a:p>
             <a:fld id="{A380659A-5C34-46FB-AFA7-F143BA8A4EDB}" type="datetimeFigureOut">
               <a:rPr lang="en-US" smtClean="0"/>
-              <a:t>3/22/2023</a:t>
+              <a:t>3/29/2023</a:t>
             </a:fld>
             <a:endParaRPr lang="en-US"/>
           </a:p>
@@ -2663,7 +2668,7 @@
           <a:p>
             <a:fld id="{A380659A-5C34-46FB-AFA7-F143BA8A4EDB}" type="datetimeFigureOut">
               <a:rPr lang="en-US" smtClean="0"/>
-              <a:t>3/22/2023</a:t>
+              <a:t>3/29/2023</a:t>
             </a:fld>
             <a:endParaRPr lang="en-US"/>
           </a:p>
@@ -2904,7 +2909,7 @@
           <a:p>
             <a:fld id="{A380659A-5C34-46FB-AFA7-F143BA8A4EDB}" type="datetimeFigureOut">
               <a:rPr lang="en-US" smtClean="0"/>
-              <a:t>3/22/2023</a:t>
+              <a:t>3/29/2023</a:t>
             </a:fld>
             <a:endParaRPr lang="en-US"/>
           </a:p>
@@ -3335,7 +3340,7 @@
         </p:nvSpPr>
         <p:spPr>
           <a:xfrm>
-            <a:off x="4551484" y="1151791"/>
+            <a:off x="4979379" y="685799"/>
             <a:ext cx="1916723" cy="803031"/>
           </a:xfrm>
           <a:prstGeom prst="rect">
@@ -3343,8 +3348,7 @@
           </a:prstGeom>
           <a:solidFill>
             <a:schemeClr val="accent1">
-              <a:lumMod val="60000"/>
-              <a:lumOff val="40000"/>
+              <a:lumMod val="75000"/>
             </a:schemeClr>
           </a:solidFill>
         </p:spPr>
@@ -3378,10 +3382,10 @@
       </p:sp>
       <p:sp>
         <p:nvSpPr>
-          <p:cNvPr id="5" name="Rectangle 4">
-            <a:extLst>
-              <a:ext uri="{FF2B5EF4-FFF2-40B4-BE49-F238E27FC236}">
-                <a16:creationId xmlns:a16="http://schemas.microsoft.com/office/drawing/2014/main" id="{FDD2A4B5-9CCB-B2CE-2AA6-06450163D0A2}"/>
+          <p:cNvPr id="7" name="Rectangle 6">
+            <a:extLst>
+              <a:ext uri="{FF2B5EF4-FFF2-40B4-BE49-F238E27FC236}">
+                <a16:creationId xmlns:a16="http://schemas.microsoft.com/office/drawing/2014/main" id="{CFB9E641-B9CE-70F8-1EF2-16B908A296BD}"/>
               </a:ext>
             </a:extLst>
           </p:cNvPr>
@@ -3390,16 +3394,15 @@
         </p:nvSpPr>
         <p:spPr>
           <a:xfrm>
-            <a:off x="800098" y="2473569"/>
-            <a:ext cx="1916723" cy="615462"/>
+            <a:off x="2467708" y="2813538"/>
+            <a:ext cx="2511671" cy="615462"/>
           </a:xfrm>
           <a:prstGeom prst="rect">
             <a:avLst/>
           </a:prstGeom>
           <a:solidFill>
             <a:schemeClr val="accent1">
-              <a:lumMod val="60000"/>
-              <a:lumOff val="40000"/>
+              <a:lumMod val="75000"/>
             </a:schemeClr>
           </a:solidFill>
         </p:spPr>
@@ -3426,307 +3429,11 @@
             <a:pPr algn="ctr"/>
             <a:r>
               <a:rPr lang="en-US"/>
-              <a:t>Hệ thống kỹ thuật</a:t>
-            </a:r>
-          </a:p>
-        </p:txBody>
-      </p:sp>
-      <p:sp>
-        <p:nvSpPr>
-          <p:cNvPr id="6" name="Rectangle 5">
-            <a:extLst>
-              <a:ext uri="{FF2B5EF4-FFF2-40B4-BE49-F238E27FC236}">
-                <a16:creationId xmlns:a16="http://schemas.microsoft.com/office/drawing/2014/main" id="{C6CF028B-AA9F-8AD3-4603-5450A8C9CA61}"/>
-              </a:ext>
-            </a:extLst>
-          </p:cNvPr>
-          <p:cNvSpPr/>
-          <p:nvPr/>
-        </p:nvSpPr>
-        <p:spPr>
-          <a:xfrm>
-            <a:off x="8147538" y="2473569"/>
-            <a:ext cx="2227385" cy="615462"/>
-          </a:xfrm>
-          <a:prstGeom prst="rect">
-            <a:avLst/>
-          </a:prstGeom>
-          <a:solidFill>
-            <a:schemeClr val="accent1">
-              <a:lumMod val="60000"/>
-              <a:lumOff val="40000"/>
-            </a:schemeClr>
-          </a:solidFill>
-        </p:spPr>
-        <p:style>
-          <a:lnRef idx="2">
-            <a:schemeClr val="accent1">
-              <a:shade val="50000"/>
-            </a:schemeClr>
-          </a:lnRef>
-          <a:fillRef idx="1">
-            <a:schemeClr val="accent1"/>
-          </a:fillRef>
-          <a:effectRef idx="0">
-            <a:schemeClr val="accent1"/>
-          </a:effectRef>
-          <a:fontRef idx="minor">
-            <a:schemeClr val="lt1"/>
-          </a:fontRef>
-        </p:style>
-        <p:txBody>
-          <a:bodyPr rtlCol="0" anchor="ctr"/>
-          <a:lstStyle/>
-          <a:p>
-            <a:pPr algn="ctr"/>
-            <a:r>
-              <a:rPr lang="en-US"/>
-              <a:t>Hệ thống kinh doanh</a:t>
-            </a:r>
-          </a:p>
-        </p:txBody>
-      </p:sp>
-      <p:sp>
-        <p:nvSpPr>
-          <p:cNvPr id="7" name="Rectangle 6">
-            <a:extLst>
-              <a:ext uri="{FF2B5EF4-FFF2-40B4-BE49-F238E27FC236}">
-                <a16:creationId xmlns:a16="http://schemas.microsoft.com/office/drawing/2014/main" id="{CFB9E641-B9CE-70F8-1EF2-16B908A296BD}"/>
-              </a:ext>
-            </a:extLst>
-          </p:cNvPr>
-          <p:cNvSpPr/>
-          <p:nvPr/>
-        </p:nvSpPr>
-        <p:spPr>
-          <a:xfrm>
-            <a:off x="2488224" y="3499339"/>
-            <a:ext cx="2511671" cy="615462"/>
-          </a:xfrm>
-          <a:prstGeom prst="rect">
-            <a:avLst/>
-          </a:prstGeom>
-          <a:solidFill>
-            <a:schemeClr val="accent1">
-              <a:lumMod val="60000"/>
-              <a:lumOff val="40000"/>
-            </a:schemeClr>
-          </a:solidFill>
-        </p:spPr>
-        <p:style>
-          <a:lnRef idx="2">
-            <a:schemeClr val="accent1">
-              <a:shade val="50000"/>
-            </a:schemeClr>
-          </a:lnRef>
-          <a:fillRef idx="1">
-            <a:schemeClr val="accent1"/>
-          </a:fillRef>
-          <a:effectRef idx="0">
-            <a:schemeClr val="accent1"/>
-          </a:effectRef>
-          <a:fontRef idx="minor">
-            <a:schemeClr val="lt1"/>
-          </a:fontRef>
-        </p:style>
-        <p:txBody>
-          <a:bodyPr rtlCol="0" anchor="ctr"/>
-          <a:lstStyle/>
-          <a:p>
-            <a:pPr algn="ctr"/>
-            <a:r>
-              <a:rPr lang="en-US"/>
-              <a:t>Phòng sửa chữa, lắp đặt</a:t>
-            </a:r>
-          </a:p>
-        </p:txBody>
-      </p:sp>
-      <p:grpSp>
-        <p:nvGrpSpPr>
-          <p:cNvPr id="11" name="Group 10">
-            <a:extLst>
-              <a:ext uri="{FF2B5EF4-FFF2-40B4-BE49-F238E27FC236}">
-                <a16:creationId xmlns:a16="http://schemas.microsoft.com/office/drawing/2014/main" id="{0F4EAC1B-6E21-325A-B1D7-AE3649054CAF}"/>
-              </a:ext>
-            </a:extLst>
-          </p:cNvPr>
-          <p:cNvGrpSpPr/>
-          <p:nvPr/>
-        </p:nvGrpSpPr>
-        <p:grpSpPr>
-          <a:xfrm>
-            <a:off x="6265984" y="3478824"/>
-            <a:ext cx="2236177" cy="2628899"/>
-            <a:chOff x="4973515" y="3590192"/>
-            <a:chExt cx="2236177" cy="2628899"/>
-          </a:xfrm>
-        </p:grpSpPr>
-        <p:sp>
-          <p:nvSpPr>
-            <p:cNvPr id="8" name="Rectangle 7">
-              <a:extLst>
-                <a:ext uri="{FF2B5EF4-FFF2-40B4-BE49-F238E27FC236}">
-                  <a16:creationId xmlns:a16="http://schemas.microsoft.com/office/drawing/2014/main" id="{118FD893-FC60-1A8A-1EE3-25AF8114DC82}"/>
-                </a:ext>
-              </a:extLst>
-            </p:cNvPr>
-            <p:cNvSpPr/>
-            <p:nvPr/>
-          </p:nvSpPr>
-          <p:spPr>
-            <a:xfrm>
-              <a:off x="4973515" y="3590192"/>
-              <a:ext cx="2227385" cy="615462"/>
-            </a:xfrm>
-            <a:prstGeom prst="rect">
-              <a:avLst/>
-            </a:prstGeom>
-            <a:solidFill>
-              <a:schemeClr val="accent1">
-                <a:lumMod val="60000"/>
-                <a:lumOff val="40000"/>
-              </a:schemeClr>
-            </a:solidFill>
-          </p:spPr>
-          <p:style>
-            <a:lnRef idx="2">
-              <a:schemeClr val="accent1">
-                <a:shade val="50000"/>
-              </a:schemeClr>
-            </a:lnRef>
-            <a:fillRef idx="1">
-              <a:schemeClr val="accent1"/>
-            </a:fillRef>
-            <a:effectRef idx="0">
-              <a:schemeClr val="accent1"/>
-            </a:effectRef>
-            <a:fontRef idx="minor">
-              <a:schemeClr val="lt1"/>
-            </a:fontRef>
-          </p:style>
-          <p:txBody>
-            <a:bodyPr rtlCol="0" anchor="ctr"/>
-            <a:lstStyle/>
-            <a:p>
-              <a:pPr algn="ctr"/>
-              <a:r>
-                <a:rPr lang="en-US"/>
-                <a:t>Phòng marketing</a:t>
-              </a:r>
-            </a:p>
-          </p:txBody>
-        </p:sp>
-        <p:sp>
-          <p:nvSpPr>
-            <p:cNvPr id="9" name="Rectangle 8">
-              <a:extLst>
-                <a:ext uri="{FF2B5EF4-FFF2-40B4-BE49-F238E27FC236}">
-                  <a16:creationId xmlns:a16="http://schemas.microsoft.com/office/drawing/2014/main" id="{3907F519-E421-A837-B0C3-696C6B8E2AEB}"/>
-                </a:ext>
-              </a:extLst>
-            </p:cNvPr>
-            <p:cNvSpPr/>
-            <p:nvPr/>
-          </p:nvSpPr>
-          <p:spPr>
-            <a:xfrm>
-              <a:off x="4982307" y="5477606"/>
-              <a:ext cx="2227385" cy="741485"/>
-            </a:xfrm>
-            <a:prstGeom prst="rect">
-              <a:avLst/>
-            </a:prstGeom>
-            <a:solidFill>
-              <a:schemeClr val="accent1">
-                <a:lumMod val="60000"/>
-                <a:lumOff val="40000"/>
-              </a:schemeClr>
-            </a:solidFill>
-          </p:spPr>
-          <p:style>
-            <a:lnRef idx="2">
-              <a:schemeClr val="accent1">
-                <a:shade val="50000"/>
-              </a:schemeClr>
-            </a:lnRef>
-            <a:fillRef idx="1">
-              <a:schemeClr val="accent1"/>
-            </a:fillRef>
-            <a:effectRef idx="0">
-              <a:schemeClr val="accent1"/>
-            </a:effectRef>
-            <a:fontRef idx="minor">
-              <a:schemeClr val="lt1"/>
-            </a:fontRef>
-          </p:style>
-          <p:txBody>
-            <a:bodyPr rtlCol="0" anchor="ctr"/>
-            <a:lstStyle/>
-            <a:p>
-              <a:pPr algn="ctr"/>
-              <a:r>
-                <a:rPr lang="en-US"/>
-                <a:t>Bộ phận chăm sóc khách hàng</a:t>
-              </a:r>
-            </a:p>
-          </p:txBody>
-        </p:sp>
-        <p:sp>
-          <p:nvSpPr>
-            <p:cNvPr id="10" name="Rectangle 9">
-              <a:extLst>
-                <a:ext uri="{FF2B5EF4-FFF2-40B4-BE49-F238E27FC236}">
-                  <a16:creationId xmlns:a16="http://schemas.microsoft.com/office/drawing/2014/main" id="{EF0A5113-FA47-1A8E-31A8-2B63B98EFAAA}"/>
-                </a:ext>
-              </a:extLst>
-            </p:cNvPr>
-            <p:cNvSpPr/>
-            <p:nvPr/>
-          </p:nvSpPr>
-          <p:spPr>
-            <a:xfrm>
-              <a:off x="4973515" y="4533899"/>
-              <a:ext cx="2227385" cy="615462"/>
-            </a:xfrm>
-            <a:prstGeom prst="rect">
-              <a:avLst/>
-            </a:prstGeom>
-            <a:solidFill>
-              <a:schemeClr val="accent1">
-                <a:lumMod val="60000"/>
-                <a:lumOff val="40000"/>
-              </a:schemeClr>
-            </a:solidFill>
-          </p:spPr>
-          <p:style>
-            <a:lnRef idx="2">
-              <a:schemeClr val="accent1">
-                <a:shade val="50000"/>
-              </a:schemeClr>
-            </a:lnRef>
-            <a:fillRef idx="1">
-              <a:schemeClr val="accent1"/>
-            </a:fillRef>
-            <a:effectRef idx="0">
-              <a:schemeClr val="accent1"/>
-            </a:effectRef>
-            <a:fontRef idx="minor">
-              <a:schemeClr val="lt1"/>
-            </a:fontRef>
-          </p:style>
-          <p:txBody>
-            <a:bodyPr rtlCol="0" anchor="ctr"/>
-            <a:lstStyle/>
-            <a:p>
-              <a:pPr algn="ctr"/>
-              <a:r>
-                <a:rPr lang="en-US"/>
-                <a:t>Phòng kế toán</a:t>
-              </a:r>
-            </a:p>
-          </p:txBody>
-        </p:sp>
-      </p:grpSp>
+              <a:t>NV sửa chữa, lắp đặt, bảo hành</a:t>
+            </a:r>
+          </a:p>
+        </p:txBody>
+      </p:sp>
       <p:cxnSp>
         <p:nvCxnSpPr>
           <p:cNvPr id="13" name="Connector: Elbow 12">
@@ -3738,18 +3445,20 @@
           </p:cNvPr>
           <p:cNvCxnSpPr>
             <a:cxnSpLocks/>
-            <a:stCxn id="4" idx="3"/>
-            <a:endCxn id="6" idx="0"/>
+            <a:stCxn id="4" idx="2"/>
+            <a:endCxn id="10" idx="0"/>
           </p:cNvCxnSpPr>
           <p:nvPr/>
         </p:nvCxnSpPr>
         <p:spPr>
-          <a:xfrm>
-            <a:off x="6468207" y="1553307"/>
-            <a:ext cx="2793024" cy="920262"/>
+          <a:xfrm rot="16200000" flipH="1">
+            <a:off x="6469674" y="956896"/>
+            <a:ext cx="1324708" cy="2388575"/>
           </a:xfrm>
-          <a:prstGeom prst="bentConnector2">
-            <a:avLst/>
+          <a:prstGeom prst="bentConnector3">
+            <a:avLst>
+              <a:gd name="adj1" fmla="val 50000"/>
+            </a:avLst>
           </a:prstGeom>
         </p:spPr>
         <p:style>
@@ -3778,18 +3487,20 @@
           </p:cNvPr>
           <p:cNvCxnSpPr>
             <a:cxnSpLocks/>
-            <a:stCxn id="4" idx="1"/>
-            <a:endCxn id="5" idx="0"/>
+            <a:stCxn id="4" idx="2"/>
+            <a:endCxn id="7" idx="0"/>
           </p:cNvCxnSpPr>
           <p:nvPr/>
         </p:nvCxnSpPr>
         <p:spPr>
-          <a:xfrm rot="10800000" flipV="1">
-            <a:off x="1758460" y="1553307"/>
-            <a:ext cx="2793024" cy="920262"/>
+          <a:xfrm rot="5400000">
+            <a:off x="4168289" y="1044086"/>
+            <a:ext cx="1324708" cy="2214197"/>
           </a:xfrm>
-          <a:prstGeom prst="bentConnector2">
-            <a:avLst/>
+          <a:prstGeom prst="bentConnector3">
+            <a:avLst>
+              <a:gd name="adj1" fmla="val 50000"/>
+            </a:avLst>
           </a:prstGeom>
         </p:spPr>
         <p:style>
@@ -3807,237 +3518,60 @@
           </a:fontRef>
         </p:style>
       </p:cxnSp>
-      <p:cxnSp>
-        <p:nvCxnSpPr>
-          <p:cNvPr id="29" name="Straight Connector 28">
-            <a:extLst>
-              <a:ext uri="{FF2B5EF4-FFF2-40B4-BE49-F238E27FC236}">
-                <a16:creationId xmlns:a16="http://schemas.microsoft.com/office/drawing/2014/main" id="{60165FBF-A5D2-3A1C-1075-0F2AD8B1B4A5}"/>
-              </a:ext>
-            </a:extLst>
-          </p:cNvPr>
-          <p:cNvCxnSpPr>
-            <a:cxnSpLocks/>
-            <a:stCxn id="6" idx="2"/>
-          </p:cNvCxnSpPr>
+      <p:sp>
+        <p:nvSpPr>
+          <p:cNvPr id="10" name="Rectangle 9">
+            <a:extLst>
+              <a:ext uri="{FF2B5EF4-FFF2-40B4-BE49-F238E27FC236}">
+                <a16:creationId xmlns:a16="http://schemas.microsoft.com/office/drawing/2014/main" id="{EF0A5113-FA47-1A8E-31A8-2B63B98EFAAA}"/>
+              </a:ext>
+            </a:extLst>
+          </p:cNvPr>
+          <p:cNvSpPr/>
           <p:nvPr/>
-        </p:nvCxnSpPr>
+        </p:nvSpPr>
         <p:spPr>
           <a:xfrm>
-            <a:off x="9261231" y="3089031"/>
-            <a:ext cx="0" cy="2681657"/>
+            <a:off x="7212623" y="2813538"/>
+            <a:ext cx="2227385" cy="615462"/>
           </a:xfrm>
-          <a:prstGeom prst="line">
+          <a:prstGeom prst="rect">
             <a:avLst/>
           </a:prstGeom>
+          <a:solidFill>
+            <a:schemeClr val="accent1">
+              <a:lumMod val="75000"/>
+            </a:schemeClr>
+          </a:solidFill>
         </p:spPr>
         <p:style>
-          <a:lnRef idx="3">
-            <a:schemeClr val="accent1"/>
+          <a:lnRef idx="2">
+            <a:schemeClr val="accent1">
+              <a:shade val="50000"/>
+            </a:schemeClr>
           </a:lnRef>
-          <a:fillRef idx="0">
+          <a:fillRef idx="1">
             <a:schemeClr val="accent1"/>
           </a:fillRef>
-          <a:effectRef idx="2">
+          <a:effectRef idx="0">
             <a:schemeClr val="accent1"/>
           </a:effectRef>
           <a:fontRef idx="minor">
-            <a:schemeClr val="tx1"/>
+            <a:schemeClr val="lt1"/>
           </a:fontRef>
         </p:style>
-      </p:cxnSp>
-      <p:cxnSp>
-        <p:nvCxnSpPr>
-          <p:cNvPr id="30" name="Straight Connector 29">
-            <a:extLst>
-              <a:ext uri="{FF2B5EF4-FFF2-40B4-BE49-F238E27FC236}">
-                <a16:creationId xmlns:a16="http://schemas.microsoft.com/office/drawing/2014/main" id="{BF739AC7-1C2B-1A1A-3575-90C7751F4C44}"/>
-              </a:ext>
-            </a:extLst>
-          </p:cNvPr>
-          <p:cNvCxnSpPr>
-            <a:cxnSpLocks/>
-            <a:stCxn id="8" idx="3"/>
-          </p:cNvCxnSpPr>
-          <p:nvPr/>
-        </p:nvCxnSpPr>
-        <p:spPr>
-          <a:xfrm>
-            <a:off x="8493369" y="3786555"/>
-            <a:ext cx="767862" cy="0"/>
-          </a:xfrm>
-          <a:prstGeom prst="line">
-            <a:avLst/>
-          </a:prstGeom>
-        </p:spPr>
-        <p:style>
-          <a:lnRef idx="3">
-            <a:schemeClr val="accent1"/>
-          </a:lnRef>
-          <a:fillRef idx="0">
-            <a:schemeClr val="accent1"/>
-          </a:fillRef>
-          <a:effectRef idx="2">
-            <a:schemeClr val="accent1"/>
-          </a:effectRef>
-          <a:fontRef idx="minor">
-            <a:schemeClr val="tx1"/>
-          </a:fontRef>
-        </p:style>
-      </p:cxnSp>
-      <p:cxnSp>
-        <p:nvCxnSpPr>
-          <p:cNvPr id="33" name="Straight Connector 32">
-            <a:extLst>
-              <a:ext uri="{FF2B5EF4-FFF2-40B4-BE49-F238E27FC236}">
-                <a16:creationId xmlns:a16="http://schemas.microsoft.com/office/drawing/2014/main" id="{AA10AFD1-4439-A5B1-DE4F-2E270DBD6280}"/>
-              </a:ext>
-            </a:extLst>
-          </p:cNvPr>
-          <p:cNvCxnSpPr>
-            <a:cxnSpLocks/>
-          </p:cNvCxnSpPr>
-          <p:nvPr/>
-        </p:nvCxnSpPr>
-        <p:spPr>
-          <a:xfrm>
-            <a:off x="8502161" y="4739056"/>
-            <a:ext cx="767862" cy="0"/>
-          </a:xfrm>
-          <a:prstGeom prst="line">
-            <a:avLst/>
-          </a:prstGeom>
-        </p:spPr>
-        <p:style>
-          <a:lnRef idx="3">
-            <a:schemeClr val="accent1"/>
-          </a:lnRef>
-          <a:fillRef idx="0">
-            <a:schemeClr val="accent1"/>
-          </a:fillRef>
-          <a:effectRef idx="2">
-            <a:schemeClr val="accent1"/>
-          </a:effectRef>
-          <a:fontRef idx="minor">
-            <a:schemeClr val="tx1"/>
-          </a:fontRef>
-        </p:style>
-      </p:cxnSp>
-      <p:cxnSp>
-        <p:nvCxnSpPr>
-          <p:cNvPr id="34" name="Straight Connector 33">
-            <a:extLst>
-              <a:ext uri="{FF2B5EF4-FFF2-40B4-BE49-F238E27FC236}">
-                <a16:creationId xmlns:a16="http://schemas.microsoft.com/office/drawing/2014/main" id="{75C029E8-735B-8C79-543E-33CAB4D948C3}"/>
-              </a:ext>
-            </a:extLst>
-          </p:cNvPr>
-          <p:cNvCxnSpPr>
-            <a:cxnSpLocks/>
-          </p:cNvCxnSpPr>
-          <p:nvPr/>
-        </p:nvCxnSpPr>
-        <p:spPr>
-          <a:xfrm>
-            <a:off x="8502161" y="5770688"/>
-            <a:ext cx="767862" cy="0"/>
-          </a:xfrm>
-          <a:prstGeom prst="line">
-            <a:avLst/>
-          </a:prstGeom>
-        </p:spPr>
-        <p:style>
-          <a:lnRef idx="3">
-            <a:schemeClr val="accent1"/>
-          </a:lnRef>
-          <a:fillRef idx="0">
-            <a:schemeClr val="accent1"/>
-          </a:fillRef>
-          <a:effectRef idx="2">
-            <a:schemeClr val="accent1"/>
-          </a:effectRef>
-          <a:fontRef idx="minor">
-            <a:schemeClr val="tx1"/>
-          </a:fontRef>
-        </p:style>
-      </p:cxnSp>
-      <p:cxnSp>
-        <p:nvCxnSpPr>
-          <p:cNvPr id="36" name="Straight Connector 35">
-            <a:extLst>
-              <a:ext uri="{FF2B5EF4-FFF2-40B4-BE49-F238E27FC236}">
-                <a16:creationId xmlns:a16="http://schemas.microsoft.com/office/drawing/2014/main" id="{680893AA-547D-1AD2-598A-C7D910142D32}"/>
-              </a:ext>
-            </a:extLst>
-          </p:cNvPr>
-          <p:cNvCxnSpPr>
-            <a:cxnSpLocks/>
-          </p:cNvCxnSpPr>
-          <p:nvPr/>
-        </p:nvCxnSpPr>
-        <p:spPr>
-          <a:xfrm>
-            <a:off x="1729153" y="3074377"/>
-            <a:ext cx="0" cy="732693"/>
-          </a:xfrm>
-          <a:prstGeom prst="line">
-            <a:avLst/>
-          </a:prstGeom>
-        </p:spPr>
-        <p:style>
-          <a:lnRef idx="3">
-            <a:schemeClr val="accent1"/>
-          </a:lnRef>
-          <a:fillRef idx="0">
-            <a:schemeClr val="accent1"/>
-          </a:fillRef>
-          <a:effectRef idx="2">
-            <a:schemeClr val="accent1"/>
-          </a:effectRef>
-          <a:fontRef idx="minor">
-            <a:schemeClr val="tx1"/>
-          </a:fontRef>
-        </p:style>
-      </p:cxnSp>
-      <p:cxnSp>
-        <p:nvCxnSpPr>
-          <p:cNvPr id="38" name="Straight Connector 37">
-            <a:extLst>
-              <a:ext uri="{FF2B5EF4-FFF2-40B4-BE49-F238E27FC236}">
-                <a16:creationId xmlns:a16="http://schemas.microsoft.com/office/drawing/2014/main" id="{C4182050-3413-DAFE-36F7-EE0D65530A8C}"/>
-              </a:ext>
-            </a:extLst>
-          </p:cNvPr>
-          <p:cNvCxnSpPr>
-            <a:cxnSpLocks/>
-            <a:stCxn id="7" idx="1"/>
-          </p:cNvCxnSpPr>
-          <p:nvPr/>
-        </p:nvCxnSpPr>
-        <p:spPr>
-          <a:xfrm flipH="1">
-            <a:off x="1720362" y="3807070"/>
-            <a:ext cx="767862" cy="0"/>
-          </a:xfrm>
-          <a:prstGeom prst="line">
-            <a:avLst/>
-          </a:prstGeom>
-        </p:spPr>
-        <p:style>
-          <a:lnRef idx="3">
-            <a:schemeClr val="accent1"/>
-          </a:lnRef>
-          <a:fillRef idx="0">
-            <a:schemeClr val="accent1"/>
-          </a:fillRef>
-          <a:effectRef idx="2">
-            <a:schemeClr val="accent1"/>
-          </a:effectRef>
-          <a:fontRef idx="minor">
-            <a:schemeClr val="tx1"/>
-          </a:fontRef>
-        </p:style>
-      </p:cxnSp>
+        <p:txBody>
+          <a:bodyPr rtlCol="0" anchor="ctr"/>
+          <a:lstStyle/>
+          <a:p>
+            <a:pPr algn="ctr"/>
+            <a:r>
+              <a:rPr lang="en-US"/>
+              <a:t>NV bán hàng</a:t>
+            </a:r>
+          </a:p>
+        </p:txBody>
+      </p:sp>
     </p:spTree>
     <p:extLst>
       <p:ext uri="{BB962C8B-B14F-4D97-AF65-F5344CB8AC3E}">

</xml_diff>